<commit_message>
slides about masters degree translated
</commit_message>
<xml_diff>
--- a/semester5.2/преза.pptx
+++ b/semester5.2/преза.pptx
@@ -12,12 +12,6 @@
     <p:sldId id="260" r:id="rId7"/>
     <p:sldId id="261" r:id="rId8"/>
     <p:sldId id="262" r:id="rId9"/>
-    <p:sldId id="263" r:id="rId10"/>
-    <p:sldId id="264" r:id="rId11"/>
-    <p:sldId id="265" r:id="rId12"/>
-    <p:sldId id="266" r:id="rId13"/>
-    <p:sldId id="267" r:id="rId14"/>
-    <p:sldId id="268" r:id="rId15"/>
   </p:sldIdLst>
   <p:sldSz cx="12192000" cy="6858000"/>
   <p:notesSz cx="6858000" cy="12192000"/>
@@ -3230,7 +3224,12 @@
             <p:ph type="ctrTitle" hasCustomPrompt="0"/>
           </p:nvPr>
         </p:nvSpPr>
-        <p:spPr bwMode="auto"/>
+        <p:spPr bwMode="auto">
+          <a:xfrm>
+            <a:off x="1571153" y="1725927"/>
+            <a:ext cx="9144000" cy="2387599"/>
+          </a:xfrm>
+        </p:spPr>
         <p:txBody>
           <a:bodyPr vertOverflow="overflow" horzOverflow="clip" vert="horz" wrap="square" lIns="91440" tIns="45720" rIns="91440" bIns="45720" numCol="1" spcCol="0" rtlCol="0" fromWordArt="0" anchor="b" anchorCtr="0" forceAA="0" upright="0" compatLnSpc="0">
             <a:normAutofit fontScale="90000" lnSpcReduction="2000"/>
@@ -3241,426 +3240,7 @@
               <a:defRPr/>
             </a:pPr>
             <a:r>
-              <a:rPr lang="en-US"/>
-              <a:t>Магістерська робота з теми "Онтологічні моделі для інформаційного пошуку"</a:t>
-            </a:r>
-            <a:endParaRPr lang="en-US"/>
-          </a:p>
-        </p:txBody>
-      </p:sp>
-      <p:sp>
-        <p:nvSpPr>
-          <p:cNvPr id="5" name="Subtitle 2" hidden="0"/>
-          <p:cNvSpPr>
-            <a:spLocks noGrp="1"/>
-          </p:cNvSpPr>
-          <p:nvPr isPhoto="0" userDrawn="0">
-            <p:ph type="subTitle" idx="1" hasCustomPrompt="0"/>
-          </p:nvPr>
-        </p:nvSpPr>
-        <p:spPr bwMode="auto"/>
-        <p:txBody>
-          <a:bodyPr/>
-          <a:lstStyle/>
-          <a:p>
-            <a:pPr>
-              <a:defRPr/>
-            </a:pPr>
-            <a:r>
-              <a:rPr lang="en-US"/>
-              <a:t>Юрченко Богдана Олегівна</a:t>
-            </a:r>
-            <a:endParaRPr lang="en-US"/>
-          </a:p>
-          <a:p>
-            <a:pPr>
-              <a:defRPr/>
-            </a:pPr>
-            <a:r>
-              <a:rPr lang="en-US"/>
-              <a:t>ТВ-01 мп </a:t>
-            </a:r>
-            <a:endParaRPr lang="en-US"/>
-          </a:p>
-          <a:p>
-            <a:pPr>
-              <a:defRPr/>
-            </a:pPr>
-            <a:r>
-              <a:rPr lang="en-US"/>
-              <a:t>Науковий керівник Коваль О.В.</a:t>
-            </a:r>
-            <a:endParaRPr lang="en-US"/>
-          </a:p>
-        </p:txBody>
-      </p:sp>
-    </p:spTree>
-  </p:cSld>
-  <p:clrMapOvr>
-    <a:masterClrMapping/>
-  </p:clrMapOvr>
-  <mc:AlternateContent xmlns:mc="http://schemas.openxmlformats.org/markup-compatibility/2006">
-    <mc:Choice xmlns:p14="http://schemas.microsoft.com/office/powerpoint/2010/main" Requires="p14">
-      <p:transition p14:dur="2000" advClick="1"/>
-    </mc:Choice>
-    <mc:Fallback>
-      <p:transition advClick="1"/>
-    </mc:Fallback>
-  </mc:AlternateContent>
-</p:sld>
-</file>
-
-<file path=ppt/slides/slide10.xml><?xml version="1.0" encoding="utf-8"?>
-<p:sld xmlns:a="http://schemas.openxmlformats.org/drawingml/2006/main" xmlns:r="http://schemas.openxmlformats.org/officeDocument/2006/relationships" xmlns:p="http://schemas.openxmlformats.org/presentationml/2006/main" xmlns:m="http://schemas.openxmlformats.org/officeDocument/2006/math" xmlns:w="http://schemas.openxmlformats.org/wordprocessingml/2006/main" showMasterPhAnim="0" show="1">
-  <p:cSld name="">
-    <p:bg>
-      <p:bgPr shadeToTitle="0">
-        <a:solidFill>
-          <a:srgbClr val="B6F573"/>
-        </a:solidFill>
-      </p:bgPr>
-    </p:bg>
-    <p:spTree>
-      <p:nvGrpSpPr>
-        <p:cNvPr id="1" name="" hidden="0"/>
-        <p:cNvGrpSpPr/>
-        <p:nvPr isPhoto="0" userDrawn="0"/>
-      </p:nvGrpSpPr>
-      <p:grpSpPr bwMode="auto">
-        <a:xfrm>
-          <a:off x="0" y="0"/>
-          <a:ext cx="0" cy="0"/>
-          <a:chOff x="0" y="0"/>
-          <a:chExt cx="0" cy="0"/>
-        </a:xfrm>
-      </p:grpSpPr>
-      <p:sp>
-        <p:nvSpPr>
-          <p:cNvPr id="4" name="Title 1" hidden="0"/>
-          <p:cNvSpPr>
-            <a:spLocks noGrp="1"/>
-          </p:cNvSpPr>
-          <p:nvPr isPhoto="0" userDrawn="0">
-            <p:ph type="title" hasCustomPrompt="0"/>
-          </p:nvPr>
-        </p:nvSpPr>
-        <p:spPr bwMode="auto"/>
-        <p:txBody>
-          <a:bodyPr/>
-          <a:lstStyle/>
-          <a:p>
-            <a:pPr>
-              <a:defRPr/>
-            </a:pPr>
-            <a:r>
-              <a:rPr/>
-              <a:t>Часткові наукове завдання</a:t>
-            </a:r>
-            <a:endParaRPr/>
-          </a:p>
-        </p:txBody>
-      </p:sp>
-      <p:sp>
-        <p:nvSpPr>
-          <p:cNvPr id="5" name="Content Placeholder 2" hidden="0"/>
-          <p:cNvSpPr>
-            <a:spLocks noGrp="1"/>
-          </p:cNvSpPr>
-          <p:nvPr isPhoto="0" userDrawn="0">
-            <p:ph idx="1" hasCustomPrompt="0"/>
-          </p:nvPr>
-        </p:nvSpPr>
-        <p:spPr bwMode="auto"/>
-        <p:txBody>
-          <a:bodyPr vertOverflow="overflow" horzOverflow="clip" vert="horz" wrap="square" lIns="91440" tIns="45720" rIns="91440" bIns="45720" numCol="1" spcCol="0" rtlCol="0" fromWordArt="0" anchor="t" anchorCtr="0" forceAA="0" upright="0" compatLnSpc="0">
-            <a:normAutofit/>
-          </a:bodyPr>
-          <a:lstStyle/>
-          <a:p>
-            <a:pPr>
-              <a:defRPr/>
-            </a:pPr>
-            <a:r>
-              <a:rPr/>
-              <a:t>Провести аналіз звітів КПІ про наукове співробітництво </a:t>
-            </a:r>
-            <a:endParaRPr/>
-          </a:p>
-          <a:p>
-            <a:pPr>
-              <a:defRPr/>
-            </a:pPr>
-            <a:r>
-              <a:rPr/>
-              <a:t>Визначити стандарти опису публікацій та інших документів</a:t>
-            </a:r>
-            <a:endParaRPr/>
-          </a:p>
-          <a:p>
-            <a:pPr>
-              <a:defRPr/>
-            </a:pPr>
-            <a:r>
-              <a:rPr lang="en-US" sz="2800" b="0" i="0" u="none" strike="noStrike" cap="none" spc="0">
-                <a:solidFill>
-                  <a:schemeClr val="tx1"/>
-                </a:solidFill>
-                <a:latin typeface="+mn-lt"/>
-                <a:ea typeface="+mn-ea"/>
-                <a:cs typeface="+mn-cs"/>
-              </a:rPr>
-              <a:t>Визначити структуру документів звітів, сутності та їх звязки </a:t>
-            </a:r>
-            <a:endParaRPr/>
-          </a:p>
-          <a:p>
-            <a:pPr>
-              <a:defRPr/>
-            </a:pPr>
-            <a:r>
-              <a:rPr/>
-              <a:t>Створити онтологію із термінами і звязками для пошуку інформації в ресурсах, засновуючись на стандартах</a:t>
-            </a:r>
-            <a:endParaRPr/>
-          </a:p>
-          <a:p>
-            <a:pPr>
-              <a:defRPr/>
-            </a:pPr>
-            <a:r>
-              <a:rPr/>
-              <a:t>Розробити програмний продукт, що шукає інформацію про міжнародне співробітництво із указаних даних джерел</a:t>
-            </a:r>
-            <a:endParaRPr/>
-          </a:p>
-          <a:p>
-            <a:pPr>
-              <a:defRPr/>
-            </a:pPr>
-            <a:r>
-              <a:rPr/>
-              <a:t>Розробити інтерфейс для перегляду та аналізу зібраних даних (пошук, фільтрація, перегляд різних сутностей тощо)</a:t>
-            </a:r>
-            <a:endParaRPr/>
-          </a:p>
-        </p:txBody>
-      </p:sp>
-    </p:spTree>
-  </p:cSld>
-  <p:clrMapOvr>
-    <a:masterClrMapping/>
-  </p:clrMapOvr>
-  <mc:AlternateContent xmlns:mc="http://schemas.openxmlformats.org/markup-compatibility/2006">
-    <mc:Choice xmlns:p14="http://schemas.microsoft.com/office/powerpoint/2010/main" Requires="p14">
-      <p:transition p14:dur="2000" advClick="1"/>
-    </mc:Choice>
-    <mc:Fallback>
-      <p:transition advClick="1"/>
-    </mc:Fallback>
-  </mc:AlternateContent>
-</p:sld>
-</file>
-
-<file path=ppt/slides/slide11.xml><?xml version="1.0" encoding="utf-8"?>
-<p:sld xmlns:a="http://schemas.openxmlformats.org/drawingml/2006/main" xmlns:r="http://schemas.openxmlformats.org/officeDocument/2006/relationships" xmlns:p="http://schemas.openxmlformats.org/presentationml/2006/main" xmlns:m="http://schemas.openxmlformats.org/officeDocument/2006/math" xmlns:w="http://schemas.openxmlformats.org/wordprocessingml/2006/main" showMasterPhAnim="0" show="1">
-  <p:cSld name="">
-    <p:bg>
-      <p:bgPr shadeToTitle="0">
-        <a:solidFill>
-          <a:srgbClr val="B6F573"/>
-        </a:solidFill>
-      </p:bgPr>
-    </p:bg>
-    <p:spTree>
-      <p:nvGrpSpPr>
-        <p:cNvPr id="1" name="" hidden="0"/>
-        <p:cNvGrpSpPr/>
-        <p:nvPr isPhoto="0" userDrawn="0"/>
-      </p:nvGrpSpPr>
-      <p:grpSpPr bwMode="auto">
-        <a:xfrm>
-          <a:off x="0" y="0"/>
-          <a:ext cx="0" cy="0"/>
-          <a:chOff x="0" y="0"/>
-          <a:chExt cx="0" cy="0"/>
-        </a:xfrm>
-      </p:grpSpPr>
-      <p:sp>
-        <p:nvSpPr>
-          <p:cNvPr id="4" name="Title 1" hidden="0"/>
-          <p:cNvSpPr>
-            <a:spLocks noGrp="1"/>
-          </p:cNvSpPr>
-          <p:nvPr isPhoto="0" userDrawn="0">
-            <p:ph type="title" hasCustomPrompt="0"/>
-          </p:nvPr>
-        </p:nvSpPr>
-        <p:spPr bwMode="auto"/>
-        <p:txBody>
-          <a:bodyPr/>
-          <a:lstStyle/>
-          <a:p>
-            <a:pPr>
-              <a:defRPr/>
-            </a:pPr>
-            <a:r>
-              <a:rPr/>
-              <a:t>Очікувані результати </a:t>
-            </a:r>
-            <a:endParaRPr/>
-          </a:p>
-        </p:txBody>
-      </p:sp>
-      <p:sp>
-        <p:nvSpPr>
-          <p:cNvPr id="5" name="Content Placeholder 2" hidden="0"/>
-          <p:cNvSpPr>
-            <a:spLocks noGrp="1"/>
-          </p:cNvSpPr>
-          <p:nvPr isPhoto="0" userDrawn="0">
-            <p:ph idx="1" hasCustomPrompt="0"/>
-          </p:nvPr>
-        </p:nvSpPr>
-        <p:spPr bwMode="auto"/>
-        <p:txBody>
-          <a:bodyPr vertOverflow="overflow" horzOverflow="clip" vert="horz" wrap="square" lIns="91440" tIns="45720" rIns="91440" bIns="45720" numCol="1" spcCol="0" rtlCol="0" fromWordArt="0" anchor="t" anchorCtr="0" forceAA="0" upright="0" compatLnSpc="0">
-            <a:normAutofit/>
-          </a:bodyPr>
-          <a:lstStyle/>
-          <a:p>
-            <a:pPr>
-              <a:defRPr/>
-            </a:pPr>
-            <a:r>
-              <a:rPr/>
-              <a:t>Розроблена (концепція) онтологія для збору інформації із звітів про міжнародне співробітництво </a:t>
-            </a:r>
-            <a:endParaRPr/>
-          </a:p>
-          <a:p>
-            <a:pPr>
-              <a:defRPr/>
-            </a:pPr>
-            <a:endParaRPr/>
-          </a:p>
-          <a:p>
-            <a:pPr>
-              <a:defRPr/>
-            </a:pPr>
-            <a:endParaRPr/>
-          </a:p>
-          <a:p>
-            <a:pPr>
-              <a:defRPr/>
-            </a:pPr>
-            <a:endParaRPr/>
-          </a:p>
-          <a:p>
-            <a:pPr>
-              <a:defRPr/>
-            </a:pPr>
-            <a:endParaRPr/>
-          </a:p>
-          <a:p>
-            <a:pPr>
-              <a:defRPr/>
-            </a:pPr>
-            <a:r>
-              <a:rPr/>
-              <a:t>Розроблений програмний продукт для автоматизації пошуку інформації в звітах про міжнародне співробітництво </a:t>
-            </a:r>
-            <a:endParaRPr/>
-          </a:p>
-        </p:txBody>
-      </p:sp>
-    </p:spTree>
-  </p:cSld>
-  <p:clrMapOvr>
-    <a:masterClrMapping/>
-  </p:clrMapOvr>
-  <mc:AlternateContent xmlns:mc="http://schemas.openxmlformats.org/markup-compatibility/2006">
-    <mc:Choice xmlns:p14="http://schemas.microsoft.com/office/powerpoint/2010/main" Requires="p14">
-      <p:transition p14:dur="2000" advClick="1"/>
-    </mc:Choice>
-    <mc:Fallback>
-      <p:transition advClick="1"/>
-    </mc:Fallback>
-  </mc:AlternateContent>
-</p:sld>
-</file>
-
-<file path=ppt/slides/slide12.xml><?xml version="1.0" encoding="utf-8"?>
-<p:sld xmlns:a="http://schemas.openxmlformats.org/drawingml/2006/main" xmlns:r="http://schemas.openxmlformats.org/officeDocument/2006/relationships" xmlns:p="http://schemas.openxmlformats.org/presentationml/2006/main" xmlns:m="http://schemas.openxmlformats.org/officeDocument/2006/math" xmlns:w="http://schemas.openxmlformats.org/wordprocessingml/2006/main" showMasterPhAnim="0" show="1">
-  <p:cSld name="">
-    <p:bg>
-      <p:bgPr shadeToTitle="0">
-        <a:solidFill>
-          <a:srgbClr val="B6F573"/>
-        </a:solidFill>
-      </p:bgPr>
-    </p:bg>
-    <p:spTree>
-      <p:nvGrpSpPr>
-        <p:cNvPr id="1" name="" hidden="0"/>
-        <p:cNvGrpSpPr/>
-        <p:nvPr isPhoto="0" userDrawn="0"/>
-      </p:nvGrpSpPr>
-      <p:grpSpPr bwMode="auto">
-        <a:xfrm>
-          <a:off x="0" y="0"/>
-          <a:ext cx="0" cy="0"/>
-          <a:chOff x="0" y="0"/>
-          <a:chExt cx="0" cy="0"/>
-        </a:xfrm>
-      </p:grpSpPr>
-      <p:sp>
-        <p:nvSpPr>
-          <p:cNvPr id="4" name="Title 1" hidden="0"/>
-          <p:cNvSpPr>
-            <a:spLocks noGrp="1"/>
-          </p:cNvSpPr>
-          <p:nvPr isPhoto="0" userDrawn="0">
-            <p:ph type="title" hasCustomPrompt="0"/>
-          </p:nvPr>
-        </p:nvSpPr>
-        <p:spPr bwMode="auto"/>
-        <p:txBody>
-          <a:bodyPr/>
-          <a:lstStyle/>
-          <a:p>
-            <a:pPr>
-              <a:defRPr/>
-            </a:pPr>
-            <a:r>
-              <a:rPr/>
-              <a:t>Попередні дослідження</a:t>
-            </a:r>
-            <a:endParaRPr/>
-          </a:p>
-        </p:txBody>
-      </p:sp>
-      <p:sp>
-        <p:nvSpPr>
-          <p:cNvPr id="5" name="Content Placeholder 2" hidden="0"/>
-          <p:cNvSpPr>
-            <a:spLocks noGrp="1"/>
-          </p:cNvSpPr>
-          <p:nvPr isPhoto="0" userDrawn="0">
-            <p:ph idx="1" hasCustomPrompt="0"/>
-          </p:nvPr>
-        </p:nvSpPr>
-        <p:spPr bwMode="auto"/>
-        <p:txBody>
-          <a:bodyPr vertOverflow="overflow" horzOverflow="clip" vert="horz" wrap="square" lIns="91440" tIns="45720" rIns="91440" bIns="45720" numCol="1" spcCol="0" rtlCol="0" fromWordArt="0" anchor="t" anchorCtr="0" forceAA="0" upright="0" compatLnSpc="0">
-            <a:normAutofit fontScale="90000" lnSpcReduction="2000"/>
-          </a:bodyPr>
-          <a:lstStyle/>
-          <a:p>
-            <a:pPr>
-              <a:defRPr/>
-            </a:pPr>
-            <a:r>
-              <a:rPr lang="en-US" sz="2800" b="0" i="0" u="none" strike="noStrike" cap="none" spc="0">
+              <a:rPr lang="en-US" sz="5400" b="0" i="0" u="none" strike="noStrike" cap="none" spc="0">
                 <a:solidFill>
                   <a:schemeClr val="tx1"/>
                 </a:solidFill>
@@ -3668,361 +3248,71 @@
                 <a:ea typeface="Arial"/>
                 <a:cs typeface="Arial"/>
               </a:rPr>
-              <a:t>Проект, в рамках якого було поставлене завдання для даної роботи </a:t>
-            </a:r>
-            <a:endParaRPr lang="en-US" sz="2800" b="0" i="0" u="none" strike="noStrike" cap="none" spc="0">
-              <a:solidFill>
-                <a:schemeClr val="tx1"/>
-              </a:solidFill>
-              <a:latin typeface="Arial"/>
-              <a:ea typeface="Arial"/>
-              <a:cs typeface="Arial"/>
-            </a:endParaRPr>
-          </a:p>
-          <a:p>
-            <a:pPr>
-              <a:defRPr/>
-            </a:pPr>
-            <a:endParaRPr lang="en-US" sz="2800" b="0" i="0" u="none" strike="noStrike" cap="none" spc="0">
-              <a:solidFill>
-                <a:schemeClr val="tx1"/>
-              </a:solidFill>
-              <a:latin typeface="Arial"/>
-              <a:ea typeface="Arial"/>
-              <a:cs typeface="Arial"/>
-            </a:endParaRPr>
-          </a:p>
-          <a:p>
-            <a:pPr>
-              <a:defRPr/>
-            </a:pPr>
-            <a:r>
-              <a:rPr lang="en-US" sz="2800" b="0" i="0" u="none" strike="noStrike" cap="none" spc="0">
-                <a:solidFill>
-                  <a:schemeClr val="tx1"/>
-                </a:solidFill>
-                <a:latin typeface="Arial"/>
-                <a:ea typeface="Arial"/>
-                <a:cs typeface="Arial"/>
-              </a:rPr>
-              <a:t>Також дослідження на тему систем підтримки прийняття рішень</a:t>
-            </a:r>
-            <a:endParaRPr lang="en-US" sz="2800" b="0" i="0" u="none" strike="noStrike" cap="none" spc="0">
-              <a:solidFill>
-                <a:schemeClr val="tx1"/>
-              </a:solidFill>
-              <a:latin typeface="Arial"/>
-              <a:ea typeface="Arial"/>
-              <a:cs typeface="Arial"/>
-            </a:endParaRPr>
-          </a:p>
-          <a:p>
-            <a:pPr>
-              <a:defRPr/>
-            </a:pPr>
-            <a:r>
-              <a:rPr lang="en-US" sz="2800" b="0" i="0" u="none" strike="noStrike" cap="none" spc="0">
-                <a:solidFill>
-                  <a:schemeClr val="tx1"/>
-                </a:solidFill>
-                <a:latin typeface="Arial"/>
-                <a:ea typeface="Arial"/>
-                <a:cs typeface="Arial"/>
-              </a:rPr>
-              <a:t>http://science.lpnu.ua/sites/default/files/journal-paper/2018/aug/14449/31.pdf</a:t>
-            </a:r>
-            <a:endParaRPr lang="en-US" sz="2800" b="0" i="0" u="none" strike="noStrike" cap="none" spc="0">
-              <a:solidFill>
-                <a:schemeClr val="tx1"/>
-              </a:solidFill>
-              <a:latin typeface="Arial"/>
-              <a:ea typeface="Arial"/>
-              <a:cs typeface="Arial"/>
-            </a:endParaRPr>
-          </a:p>
-          <a:p>
-            <a:pPr>
-              <a:defRPr/>
-            </a:pPr>
-            <a:r>
-              <a:rPr lang="en-US" sz="2800" b="0" i="0" u="none" strike="noStrike" cap="none" spc="0">
-                <a:solidFill>
-                  <a:schemeClr val="tx1"/>
-                </a:solidFill>
-                <a:latin typeface="Arial"/>
-                <a:ea typeface="Arial"/>
-                <a:cs typeface="Arial"/>
-              </a:rPr>
-              <a:t>https://files.nas.gov.ua/PublicMessages/Documents/0/2019/11/191114173146616-5187.pdf</a:t>
-            </a:r>
-            <a:endParaRPr lang="en-US" sz="2800" b="0" i="0" u="none" strike="noStrike" cap="none" spc="0">
-              <a:solidFill>
-                <a:schemeClr val="tx1"/>
-              </a:solidFill>
-              <a:latin typeface="Arial"/>
-              <a:ea typeface="Arial"/>
-              <a:cs typeface="Arial"/>
-            </a:endParaRPr>
-          </a:p>
-          <a:p>
-            <a:pPr>
-              <a:defRPr/>
-            </a:pPr>
-            <a:endParaRPr lang="en-US" sz="2800" b="0" i="0" u="none" strike="noStrike" cap="none" spc="0">
-              <a:solidFill>
-                <a:schemeClr val="tx1"/>
-              </a:solidFill>
-              <a:latin typeface="Arial"/>
-              <a:ea typeface="Arial"/>
-              <a:cs typeface="Arial"/>
-            </a:endParaRPr>
-          </a:p>
-          <a:p>
-            <a:pPr>
-              <a:defRPr/>
-            </a:pPr>
-            <a:endParaRPr/>
-          </a:p>
-        </p:txBody>
-      </p:sp>
-    </p:spTree>
-  </p:cSld>
-  <p:clrMapOvr>
-    <a:masterClrMapping/>
-  </p:clrMapOvr>
-  <mc:AlternateContent xmlns:mc="http://schemas.openxmlformats.org/markup-compatibility/2006">
-    <mc:Choice xmlns:p14="http://schemas.microsoft.com/office/powerpoint/2010/main" Requires="p14">
-      <p:transition p14:dur="2000" advClick="1"/>
-    </mc:Choice>
-    <mc:Fallback>
-      <p:transition advClick="1"/>
-    </mc:Fallback>
-  </mc:AlternateContent>
-</p:sld>
-</file>
-
-<file path=ppt/slides/slide13.xml><?xml version="1.0" encoding="utf-8"?>
-<p:sld xmlns:a="http://schemas.openxmlformats.org/drawingml/2006/main" xmlns:r="http://schemas.openxmlformats.org/officeDocument/2006/relationships" xmlns:p="http://schemas.openxmlformats.org/presentationml/2006/main" xmlns:m="http://schemas.openxmlformats.org/officeDocument/2006/math" xmlns:w="http://schemas.openxmlformats.org/wordprocessingml/2006/main" showMasterPhAnim="0" show="1">
-  <p:cSld name="">
-    <p:bg>
-      <p:bgPr shadeToTitle="0">
-        <a:solidFill>
-          <a:srgbClr val="B6F573"/>
-        </a:solidFill>
-      </p:bgPr>
-    </p:bg>
-    <p:spTree>
-      <p:nvGrpSpPr>
-        <p:cNvPr id="1" name="" hidden="0"/>
-        <p:cNvGrpSpPr/>
-        <p:nvPr isPhoto="0" userDrawn="0"/>
-      </p:nvGrpSpPr>
-      <p:grpSpPr bwMode="auto">
-        <a:xfrm>
-          <a:off x="0" y="0"/>
-          <a:ext cx="0" cy="0"/>
-          <a:chOff x="0" y="0"/>
-          <a:chExt cx="0" cy="0"/>
-        </a:xfrm>
-      </p:grpSpPr>
-      <p:sp>
-        <p:nvSpPr>
-          <p:cNvPr id="4" name="Title 1" hidden="0"/>
-          <p:cNvSpPr>
-            <a:spLocks noGrp="1"/>
-          </p:cNvSpPr>
-          <p:nvPr isPhoto="0" userDrawn="0">
-            <p:ph type="title" hasCustomPrompt="0"/>
-          </p:nvPr>
-        </p:nvSpPr>
-        <p:spPr bwMode="auto"/>
-        <p:txBody>
-          <a:bodyPr/>
-          <a:lstStyle/>
-          <a:p>
-            <a:pPr>
-              <a:defRPr/>
-            </a:pPr>
-            <a:r>
-              <a:rPr lang="en-US" sz="4400" b="0" i="0" u="none" strike="noStrike" cap="none" spc="0">
-                <a:solidFill>
-                  <a:schemeClr val="tx1"/>
-                </a:solidFill>
-                <a:latin typeface="+mj-lt"/>
-                <a:ea typeface="+mj-ea"/>
-                <a:cs typeface="+mj-cs"/>
-              </a:rPr>
-              <a:t>Попередні дослідження</a:t>
-            </a:r>
-            <a:endParaRPr/>
-          </a:p>
-        </p:txBody>
-      </p:sp>
-      <p:sp>
-        <p:nvSpPr>
-          <p:cNvPr id="5" name="Content Placeholder 2" hidden="0"/>
-          <p:cNvSpPr>
-            <a:spLocks noGrp="1"/>
-          </p:cNvSpPr>
-          <p:nvPr isPhoto="0" userDrawn="0">
-            <p:ph idx="1" hasCustomPrompt="0"/>
-          </p:nvPr>
-        </p:nvSpPr>
-        <p:spPr bwMode="auto"/>
-        <p:txBody>
-          <a:bodyPr/>
-          <a:lstStyle/>
-          <a:p>
-            <a:pPr>
-              <a:defRPr/>
-            </a:pPr>
-            <a:r>
-              <a:rPr sz="2000" b="0" i="0" u="none">
-                <a:solidFill>
-                  <a:srgbClr val="000000"/>
-                </a:solidFill>
-                <a:latin typeface="Times New Roman"/>
-                <a:ea typeface="Times New Roman"/>
-                <a:cs typeface="Times New Roman"/>
-              </a:rPr>
-              <a:t>Магістерська дисертація : </a:t>
-            </a:r>
-            <a:r>
-              <a:rPr sz="2000" b="0" i="0" u="none">
-                <a:solidFill>
-                  <a:srgbClr val="000000"/>
-                </a:solidFill>
-                <a:latin typeface="Times New Roman"/>
-                <a:ea typeface="Times New Roman"/>
-                <a:cs typeface="Times New Roman"/>
-              </a:rPr>
-              <a:t>Підхід до інтеграції реляційних баз даних з використанням онтологій</a:t>
-            </a:r>
-            <a:r>
-              <a:rPr sz="2000" b="0">
-                <a:latin typeface="Times New Roman"/>
-                <a:ea typeface="Times New Roman"/>
-                <a:cs typeface="Times New Roman"/>
-              </a:rPr>
-              <a:t>  (в рамках даної теми може розглядатися також інтеграція із реляційними базами даних)  </a:t>
-            </a:r>
-            <a:r>
-              <a:rPr sz="2000" b="0" i="0" u="none">
-                <a:solidFill>
-                  <a:srgbClr val="000000"/>
-                </a:solidFill>
-                <a:latin typeface="Times New Roman"/>
-                <a:ea typeface="Times New Roman"/>
-                <a:cs typeface="Times New Roman"/>
-              </a:rPr>
-              <a:t>Домарацький Анатолій Сергійович </a:t>
-            </a:r>
-            <a:endParaRPr sz="2000" b="0">
-              <a:latin typeface="Times New Roman"/>
-              <a:ea typeface="Times New Roman"/>
-              <a:cs typeface="Times New Roman"/>
-            </a:endParaRPr>
-          </a:p>
-          <a:p>
-            <a:pPr>
-              <a:defRPr/>
-            </a:pPr>
-            <a:endParaRPr sz="2000" b="0">
-              <a:latin typeface="Times New Roman"/>
-              <a:ea typeface="Times New Roman"/>
-              <a:cs typeface="Times New Roman"/>
-            </a:endParaRPr>
-          </a:p>
-          <a:p>
-            <a:pPr>
-              <a:defRPr/>
-            </a:pPr>
-            <a:r>
-              <a:rPr sz="2000" b="0" i="0" u="none">
-                <a:solidFill>
-                  <a:srgbClr val="000000"/>
-                </a:solidFill>
-                <a:latin typeface="Times New Roman"/>
-                <a:ea typeface="Times New Roman"/>
-                <a:cs typeface="Times New Roman"/>
-              </a:rPr>
-              <a:t>ІНТЕГРАЦІЯ БАЗ ДАНИХ ТА БАЗ ЗНАНЬ НА ОСНОВІ ОНТОЛОГІЇ </a:t>
-            </a:r>
-            <a:r>
-              <a:rPr sz="2000" b="0" i="0" u="none">
-                <a:solidFill>
-                  <a:srgbClr val="000000"/>
-                </a:solidFill>
-                <a:latin typeface="Times New Roman"/>
-                <a:ea typeface="Times New Roman"/>
-                <a:cs typeface="Times New Roman"/>
-              </a:rPr>
-              <a:t>д.т.н. Глоба Л.С. (ІТС НТУУ „КПІ”) к.т.н. Терновой М.Ю. (ІТС НТУУ „КПІ”) Штогріна О. С. (ІТС НТУУ „КПІ”)</a:t>
-            </a:r>
-            <a:endParaRPr sz="2000" b="0" i="0" u="none">
-              <a:solidFill>
-                <a:srgbClr val="000000"/>
-              </a:solidFill>
-              <a:latin typeface="Times New Roman"/>
-              <a:ea typeface="Times New Roman"/>
-              <a:cs typeface="Times New Roman"/>
-            </a:endParaRPr>
-          </a:p>
-          <a:p>
-            <a:pPr>
-              <a:defRPr/>
-            </a:pPr>
-            <a:endParaRPr sz="2000" b="0" i="0" u="none">
-              <a:solidFill>
-                <a:srgbClr val="000000"/>
-              </a:solidFill>
-              <a:latin typeface="Times New Roman"/>
-              <a:ea typeface="Times New Roman"/>
-              <a:cs typeface="Times New Roman"/>
-            </a:endParaRPr>
-          </a:p>
-          <a:p>
-            <a:pPr>
-              <a:defRPr/>
-            </a:pPr>
-            <a:r>
-              <a:rPr sz="2000" b="0" i="0" u="none">
-                <a:solidFill>
-                  <a:srgbClr val="000000"/>
-                </a:solidFill>
-                <a:latin typeface="Times New Roman"/>
-                <a:ea typeface="Times New Roman"/>
-                <a:cs typeface="Times New Roman"/>
-              </a:rPr>
-              <a:t>Стаття Онтології у контексті інтеграції інформації: представлення, методи та інструменти побудови </a:t>
-            </a:r>
-            <a:r>
-              <a:rPr sz="2000" b="0" i="0" u="none">
-                <a:solidFill>
-                  <a:srgbClr val="000000"/>
-                </a:solidFill>
-                <a:latin typeface="Times New Roman"/>
-                <a:ea typeface="Times New Roman"/>
-                <a:cs typeface="Times New Roman"/>
-              </a:rPr>
-              <a:t>   : </a:t>
-            </a:r>
-            <a:r>
-              <a:rPr sz="2000" b="0" i="0" u="none">
-                <a:solidFill>
-                  <a:srgbClr val="000000"/>
-                </a:solidFill>
-                <a:latin typeface="Times New Roman"/>
-                <a:ea typeface="Times New Roman"/>
-                <a:cs typeface="Times New Roman"/>
-              </a:rPr>
-              <a:t>О.М. Овдій, Г.Ю. Проскудіна</a:t>
-            </a:r>
-            <a:endParaRPr sz="2000" b="0">
-              <a:latin typeface="Times New Roman"/>
-              <a:ea typeface="Times New Roman"/>
-              <a:cs typeface="Times New Roman"/>
-            </a:endParaRPr>
+              <a:t>Master's degree dissertation </a:t>
+            </a:r>
+            <a:r>
+              <a:rPr lang="en-US"/>
+              <a:t> </a:t>
+            </a:r>
+            <a:br>
+              <a:rPr lang="en-US"/>
+            </a:br>
+            <a:r>
+              <a:rPr lang="en-US"/>
+              <a:t>Topic : "Ontology based models for information search"</a:t>
+            </a:r>
+            <a:endParaRPr lang="en-US"/>
+          </a:p>
+        </p:txBody>
+      </p:sp>
+      <p:sp>
+        <p:nvSpPr>
+          <p:cNvPr id="5" name="Subtitle 2" hidden="0"/>
+          <p:cNvSpPr>
+            <a:spLocks noGrp="1"/>
+          </p:cNvSpPr>
+          <p:nvPr isPhoto="0" userDrawn="0">
+            <p:ph type="subTitle" idx="1" hasCustomPrompt="0"/>
+          </p:nvPr>
+        </p:nvSpPr>
+        <p:spPr bwMode="auto">
+          <a:xfrm>
+            <a:off x="1523999" y="4365924"/>
+            <a:ext cx="9144000" cy="1655761"/>
+          </a:xfrm>
+        </p:spPr>
+        <p:txBody>
+          <a:bodyPr/>
+          <a:lstStyle/>
+          <a:p>
+            <a:pPr>
+              <a:defRPr/>
+            </a:pPr>
+            <a:r>
+              <a:rPr lang="en-US"/>
+              <a:t>Done by: Bohdana Yurchenko</a:t>
+            </a:r>
+            <a:endParaRPr lang="en-US"/>
+          </a:p>
+          <a:p>
+            <a:pPr>
+              <a:defRPr/>
+            </a:pPr>
+            <a:r>
+              <a:rPr lang="en-US"/>
+              <a:t>TV-01</a:t>
+            </a:r>
+            <a:endParaRPr lang="en-US"/>
+          </a:p>
+          <a:p>
+            <a:pPr>
+              <a:defRPr/>
+            </a:pPr>
+            <a:r>
+              <a:rPr lang="en-US"/>
+              <a:t>Adviser:  Коваль О.В.</a:t>
+            </a:r>
+            <a:endParaRPr lang="en-US"/>
           </a:p>
         </p:txBody>
       </p:sp>
@@ -4084,6 +3374,17 @@
             <a:pPr>
               <a:defRPr/>
             </a:pPr>
+            <a:r>
+              <a:rPr lang="en-US" sz="4400" b="0" i="0" u="none" strike="noStrike" cap="none" spc="0">
+                <a:solidFill>
+                  <a:schemeClr val="tx1"/>
+                </a:solidFill>
+                <a:latin typeface="+mj-lt"/>
+                <a:ea typeface="+mj-ea"/>
+                <a:cs typeface="+mj-cs"/>
+              </a:rPr>
+              <a:t>Actuality. Problem found in the domain</a:t>
+            </a:r>
             <a:endParaRPr/>
           </a:p>
         </p:txBody>
@@ -4100,38 +3401,77 @@
         </p:nvSpPr>
         <p:spPr bwMode="auto"/>
         <p:txBody>
-          <a:bodyPr/>
-          <a:lstStyle/>
-          <a:p>
-            <a:pPr>
-              <a:defRPr/>
-            </a:pPr>
-            <a:endParaRPr/>
-          </a:p>
-        </p:txBody>
-      </p:sp>
-      <p:pic>
-        <p:nvPicPr>
-          <p:cNvPr id="6" name="" hidden="0"/>
-          <p:cNvPicPr>
-            <a:picLocks noChangeAspect="1"/>
-          </p:cNvPicPr>
-          <p:nvPr isPhoto="0" userDrawn="0"/>
-        </p:nvPicPr>
-        <p:blipFill>
-          <a:blip r:embed="rId2"/>
-          <a:stretch/>
-        </p:blipFill>
-        <p:spPr bwMode="auto">
-          <a:xfrm flipH="0" flipV="0">
-            <a:off x="1249724" y="37400"/>
-            <a:ext cx="9572625" cy="6768721"/>
-          </a:xfrm>
-          <a:prstGeom prst="rect">
-            <a:avLst/>
-          </a:prstGeom>
-        </p:spPr>
-      </p:pic>
+          <a:bodyPr vertOverflow="overflow" horzOverflow="clip" vert="horz" wrap="square" lIns="91440" tIns="45720" rIns="91440" bIns="45720" numCol="1" spcCol="0" rtlCol="0" fromWordArt="0" anchor="t" anchorCtr="0" forceAA="0" upright="0" compatLnSpc="0">
+            <a:normAutofit/>
+          </a:bodyPr>
+          <a:lstStyle/>
+          <a:p>
+            <a:pPr marL="0" indent="0">
+              <a:buFont typeface="Arial"/>
+              <a:buNone/>
+              <a:defRPr/>
+            </a:pPr>
+            <a:r>
+              <a:rPr/>
+              <a:t>Currently, as mentioned in the previous presentation, there is no software, dedicated to </a:t>
+            </a:r>
+            <a:r>
+              <a:rPr lang="en-US" sz="2800" b="0" i="0" u="none" strike="noStrike" cap="none" spc="0">
+                <a:solidFill>
+                  <a:schemeClr val="tx1"/>
+                </a:solidFill>
+                <a:latin typeface="+mn-lt"/>
+                <a:ea typeface="+mn-ea"/>
+                <a:cs typeface="+mn-cs"/>
+              </a:rPr>
+              <a:t>international cooperations reports analysis. </a:t>
+            </a:r>
+            <a:endParaRPr lang="en-US" sz="2800" b="0" i="0" u="none" strike="noStrike" cap="none" spc="0">
+              <a:solidFill>
+                <a:schemeClr val="tx1"/>
+              </a:solidFill>
+              <a:latin typeface="+mn-lt"/>
+              <a:ea typeface="+mn-ea"/>
+              <a:cs typeface="+mn-cs"/>
+            </a:endParaRPr>
+          </a:p>
+          <a:p>
+            <a:pPr marL="0" indent="0">
+              <a:buFont typeface="Arial"/>
+              <a:buNone/>
+              <a:defRPr/>
+            </a:pPr>
+            <a:endParaRPr/>
+          </a:p>
+          <a:p>
+            <a:pPr marL="0" indent="0">
+              <a:buFont typeface="Arial"/>
+              <a:buNone/>
+              <a:defRPr/>
+            </a:pPr>
+            <a:r>
+              <a:rPr/>
+              <a:t>The software to be developed is aimed to simplify and automate gathering of distributed information about  </a:t>
+            </a:r>
+            <a:r>
+              <a:rPr lang="en-US" sz="2800" b="0" i="0" u="none" strike="noStrike" cap="none" spc="0">
+                <a:solidFill>
+                  <a:schemeClr val="tx1"/>
+                </a:solidFill>
+                <a:latin typeface="+mn-lt"/>
+                <a:ea typeface="+mn-ea"/>
+                <a:cs typeface="+mn-cs"/>
+              </a:rPr>
+              <a:t>international cooperation of different </a:t>
+            </a:r>
+            <a:r>
+              <a:rPr/>
+              <a:t>departments of a certain company, institute etc.</a:t>
+            </a:r>
+            <a:endParaRPr/>
+          </a:p>
+        </p:txBody>
+      </p:sp>
     </p:spTree>
   </p:cSld>
   <p:clrMapOvr>
@@ -4190,6 +3530,10 @@
             <a:pPr>
               <a:defRPr/>
             </a:pPr>
+            <a:r>
+              <a:rPr/>
+              <a:t>Problem to solve</a:t>
+            </a:r>
             <a:endParaRPr/>
           </a:p>
         </p:txBody>
@@ -4204,57 +3548,104 @@
             <p:ph idx="1" hasCustomPrompt="0"/>
           </p:nvPr>
         </p:nvSpPr>
-        <p:spPr bwMode="auto">
-          <a:xfrm flipH="0" flipV="0">
-            <a:off x="9079274" y="2948399"/>
-            <a:ext cx="2426924" cy="3323812"/>
-          </a:xfrm>
-        </p:spPr>
-        <p:txBody>
-          <a:bodyPr/>
-          <a:lstStyle/>
-          <a:p>
-            <a:pPr>
-              <a:defRPr/>
-            </a:pPr>
-            <a:r>
-              <a:rPr lang="en-US" sz="2800" b="0" i="0" u="sng" strike="noStrike" cap="none" spc="0">
+        <p:spPr bwMode="auto"/>
+        <p:txBody>
+          <a:bodyPr vertOverflow="overflow" horzOverflow="clip" vert="horz" wrap="square" lIns="91440" tIns="45720" rIns="91440" bIns="45720" numCol="1" spcCol="0" rtlCol="0" fromWordArt="0" anchor="t" anchorCtr="0" forceAA="0" upright="0" compatLnSpc="0">
+            <a:normAutofit/>
+          </a:bodyPr>
+          <a:lstStyle/>
+          <a:p>
+            <a:pPr marL="0" indent="0">
+              <a:buFont typeface="Arial"/>
+              <a:buNone/>
+              <a:defRPr/>
+            </a:pPr>
+            <a:r>
+              <a:rPr/>
+              <a:t>All the information about </a:t>
+            </a:r>
+            <a:r>
+              <a:rPr lang="en-US" sz="2800" b="0" i="0" u="none" strike="noStrike" cap="none" spc="0">
                 <a:solidFill>
                   <a:schemeClr val="tx1"/>
                 </a:solidFill>
-                <a:latin typeface="Arial"/>
-                <a:ea typeface="Arial"/>
-                <a:cs typeface="Arial"/>
-                <a:hlinkClick r:id="rId2" tooltip="https://sci-conf.com.ua/wp-content/uploads/2020/11/PRIORITY-DIRECTIONS-OF-SCIENCE-AND-TECHNOLOGY-DEVELOPMENT-22-24.11.20.pdf"/>
+                <a:latin typeface="+mn-lt"/>
+                <a:ea typeface="+mn-ea"/>
+                <a:cs typeface="+mn-cs"/>
               </a:rPr>
-              <a:t>link to pdf</a:t>
-            </a:r>
-            <a:endParaRPr/>
-          </a:p>
-        </p:txBody>
-      </p:sp>
-      <p:pic>
-        <p:nvPicPr>
-          <p:cNvPr id="6" name="" hidden="0"/>
-          <p:cNvPicPr>
-            <a:picLocks noChangeAspect="1"/>
-          </p:cNvPicPr>
-          <p:nvPr isPhoto="0" userDrawn="0"/>
-        </p:nvPicPr>
-        <p:blipFill>
-          <a:blip r:embed="rId3"/>
-          <a:stretch/>
-        </p:blipFill>
-        <p:spPr bwMode="auto">
-          <a:xfrm>
-            <a:off x="1205340" y="9524"/>
-            <a:ext cx="6714269" cy="6857999"/>
-          </a:xfrm>
-          <a:prstGeom prst="rect">
-            <a:avLst/>
-          </a:prstGeom>
-        </p:spPr>
-      </p:pic>
+              <a:t>international cooperations is gathered independently for each department of a university and published in a form of a free text document, that cannot be easily parsed by machine. </a:t>
+            </a:r>
+            <a:endParaRPr lang="en-US" sz="2800" b="0" i="0" u="none" strike="noStrike" cap="none" spc="0">
+              <a:solidFill>
+                <a:schemeClr val="tx1"/>
+              </a:solidFill>
+              <a:latin typeface="+mn-lt"/>
+              <a:ea typeface="+mn-ea"/>
+              <a:cs typeface="+mn-cs"/>
+            </a:endParaRPr>
+          </a:p>
+          <a:p>
+            <a:pPr marL="0" indent="0">
+              <a:buFont typeface="Arial"/>
+              <a:buNone/>
+              <a:defRPr/>
+            </a:pPr>
+            <a:endParaRPr lang="en-US" sz="2800" b="0" i="0" u="none" strike="noStrike" cap="none" spc="0">
+              <a:solidFill>
+                <a:schemeClr val="tx1"/>
+              </a:solidFill>
+              <a:latin typeface="Arial"/>
+              <a:ea typeface="Arial"/>
+              <a:cs typeface="Arial"/>
+            </a:endParaRPr>
+          </a:p>
+          <a:p>
+            <a:pPr marL="0" indent="0">
+              <a:buFont typeface="Arial"/>
+              <a:buNone/>
+              <a:defRPr/>
+            </a:pPr>
+            <a:r>
+              <a:rPr lang="en-US" sz="2800" b="0" i="0" u="none" strike="noStrike" cap="none" spc="0">
+                <a:solidFill>
+                  <a:schemeClr val="tx1"/>
+                </a:solidFill>
+                <a:latin typeface="+mn-lt"/>
+                <a:ea typeface="+mn-ea"/>
+                <a:cs typeface="+mn-cs"/>
+              </a:rPr>
+              <a:t>So it takes a lot of time and effort for a dedicated person to analyze all reports in order to, let’s say, generate a generalized refort about the whole universtity. </a:t>
+            </a:r>
+            <a:endParaRPr lang="en-US" sz="2800" b="0" i="0" u="none" strike="noStrike" cap="none" spc="0">
+              <a:solidFill>
+                <a:schemeClr val="tx1"/>
+              </a:solidFill>
+              <a:latin typeface="+mn-lt"/>
+              <a:ea typeface="+mn-ea"/>
+              <a:cs typeface="+mn-cs"/>
+            </a:endParaRPr>
+          </a:p>
+          <a:p>
+            <a:pPr marL="0" indent="0">
+              <a:buFont typeface="Arial"/>
+              <a:buNone/>
+              <a:defRPr/>
+            </a:pPr>
+            <a:r>
+              <a:rPr lang="en-US" sz="2800" b="0" i="0" u="none" strike="noStrike" cap="none" spc="0">
+                <a:solidFill>
+                  <a:schemeClr val="tx1"/>
+                </a:solidFill>
+                <a:latin typeface="+mn-lt"/>
+                <a:ea typeface="+mn-ea"/>
+                <a:cs typeface="+mn-cs"/>
+              </a:rPr>
+              <a:t>The work is hard, demanding and too costy. </a:t>
+            </a:r>
+            <a:endParaRPr lang="en-US"/>
+          </a:p>
+        </p:txBody>
+      </p:sp>
     </p:spTree>
   </p:cSld>
   <p:clrMapOvr>
@@ -4315,7 +3706,7 @@
             </a:pPr>
             <a:r>
               <a:rPr/>
-              <a:t>Стаття </a:t>
+              <a:t>Extended usecases</a:t>
             </a:r>
             <a:endParaRPr/>
           </a:p>
@@ -4333,67 +3724,64 @@
         </p:nvSpPr>
         <p:spPr bwMode="auto"/>
         <p:txBody>
-          <a:bodyPr/>
-          <a:lstStyle/>
-          <a:p>
-            <a:pPr>
-              <a:defRPr/>
-            </a:pPr>
-            <a:r>
-              <a:rPr/>
-              <a:t>В процесі написання </a:t>
-            </a:r>
-            <a:endParaRPr/>
-          </a:p>
-          <a:p>
-            <a:pPr>
-              <a:defRPr/>
-            </a:pPr>
-            <a:endParaRPr/>
-          </a:p>
-          <a:p>
-            <a:pPr>
-              <a:defRPr/>
-            </a:pPr>
-            <a:r>
-              <a:rPr/>
-              <a:t>" </a:t>
-            </a:r>
-            <a:r>
-              <a:rPr lang="en-US" sz="2800" b="0" i="0" u="none" strike="noStrike" cap="none" spc="0">
-                <a:solidFill>
-                  <a:schemeClr val="tx1"/>
-                </a:solidFill>
-                <a:latin typeface="Arial"/>
-                <a:ea typeface="Arial"/>
-                <a:cs typeface="Arial"/>
-              </a:rPr>
-              <a:t>Розробка системи для спільної розробки онтологій </a:t>
-            </a:r>
-            <a:r>
-              <a:rPr/>
-              <a:t>"</a:t>
-            </a:r>
-            <a:endParaRPr/>
-          </a:p>
-          <a:p>
-            <a:pPr marL="0" indent="0">
-              <a:buFont typeface="Arial"/>
-              <a:buNone/>
-              <a:defRPr/>
-            </a:pPr>
-            <a:endParaRPr/>
-          </a:p>
-          <a:p>
-            <a:pPr marL="0" indent="0">
-              <a:buFont typeface="Arial"/>
-              <a:buNone/>
-              <a:defRPr/>
-            </a:pPr>
-            <a:endParaRPr/>
-          </a:p>
-        </p:txBody>
-      </p:sp>
+          <a:bodyPr vertOverflow="overflow" horzOverflow="clip" vert="horz" wrap="square" lIns="91440" tIns="45720" rIns="91440" bIns="45720" numCol="1" spcCol="0" rtlCol="0" fromWordArt="0" anchor="t" anchorCtr="0" forceAA="0" upright="0" compatLnSpc="0">
+            <a:normAutofit/>
+          </a:bodyPr>
+          <a:lstStyle/>
+          <a:p>
+            <a:pPr>
+              <a:defRPr/>
+            </a:pPr>
+            <a:endParaRPr/>
+          </a:p>
+        </p:txBody>
+      </p:sp>
+      <p:pic>
+        <p:nvPicPr>
+          <p:cNvPr id="6" name="" hidden="0"/>
+          <p:cNvPicPr>
+            <a:picLocks noChangeAspect="1"/>
+          </p:cNvPicPr>
+          <p:nvPr isPhoto="0" userDrawn="0"/>
+        </p:nvPicPr>
+        <p:blipFill>
+          <a:blip r:embed="rId2"/>
+          <a:srcRect l="0" t="0" r="0" b="36342"/>
+          <a:stretch/>
+        </p:blipFill>
+        <p:spPr bwMode="auto">
+          <a:xfrm flipH="0" flipV="0">
+            <a:off x="6854667" y="608661"/>
+            <a:ext cx="5135249" cy="5747685"/>
+          </a:xfrm>
+          <a:prstGeom prst="rect">
+            <a:avLst/>
+          </a:prstGeom>
+        </p:spPr>
+      </p:pic>
+      <p:pic>
+        <p:nvPicPr>
+          <p:cNvPr id="7" name="" hidden="0"/>
+          <p:cNvPicPr>
+            <a:picLocks noChangeAspect="1"/>
+          </p:cNvPicPr>
+          <p:nvPr isPhoto="0" userDrawn="0"/>
+        </p:nvPicPr>
+        <p:blipFill>
+          <a:blip r:embed="rId3"/>
+          <a:srcRect l="0" t="70605" r="21736" b="2557"/>
+          <a:stretch/>
+        </p:blipFill>
+        <p:spPr bwMode="auto">
+          <a:xfrm flipH="0" flipV="0">
+            <a:off x="886727" y="3784682"/>
+            <a:ext cx="5336080" cy="2571664"/>
+          </a:xfrm>
+          <a:prstGeom prst="rect">
+            <a:avLst/>
+          </a:prstGeom>
+        </p:spPr>
+      </p:pic>
     </p:spTree>
   </p:cSld>
   <p:clrMapOvr>
@@ -4454,7 +3842,7 @@
             </a:pPr>
             <a:r>
               <a:rPr/>
-              <a:t>Актуальність дослідження. Проблема </a:t>
+              <a:t>Extended usecases</a:t>
             </a:r>
             <a:endParaRPr/>
           </a:p>
@@ -4480,56 +3868,57 @@
             <a:pPr>
               <a:defRPr/>
             </a:pPr>
-            <a:r>
-              <a:rPr lang="en-US" sz="2800" b="0" i="0" u="none" strike="noStrike" cap="none" spc="0">
-                <a:solidFill>
-                  <a:schemeClr val="tx1"/>
-                </a:solidFill>
-                <a:latin typeface="Arial"/>
-                <a:ea typeface="Arial"/>
-                <a:cs typeface="Arial"/>
-              </a:rPr>
-              <a:t>Задача роботи була визначена в результаті роботи на тему: «Дослідження і впровадження ключових технологій для моніторингу розвитку міжнародного співробітництва та створення системи підтримки ухвалення рішень в науково-технічній сфері». </a:t>
-            </a:r>
-            <a:endParaRPr lang="en-US" sz="2800" b="0" i="0" u="none" strike="noStrike" cap="none" spc="0">
-              <a:solidFill>
-                <a:schemeClr val="tx1"/>
-              </a:solidFill>
-              <a:latin typeface="Arial"/>
-              <a:ea typeface="Arial"/>
-              <a:cs typeface="Arial"/>
-            </a:endParaRPr>
-          </a:p>
-          <a:p>
-            <a:pPr>
-              <a:defRPr/>
-            </a:pPr>
-            <a:r>
-              <a:rPr lang="en-US" sz="2800" b="0" i="0" u="none" strike="noStrike" cap="none" spc="0">
-                <a:solidFill>
-                  <a:schemeClr val="tx1"/>
-                </a:solidFill>
-                <a:latin typeface="Arial"/>
-                <a:ea typeface="Arial"/>
-                <a:cs typeface="Arial"/>
-              </a:rPr>
-              <a:t>Завданнями роботи є дослідження і розробка ключових технологій для </a:t>
-            </a:r>
-            <a:r>
-              <a:rPr lang="en-US" sz="2800" b="0" i="0" u="sng" strike="noStrike" cap="none" spc="0">
-                <a:solidFill>
-                  <a:schemeClr val="tx1"/>
-                </a:solidFill>
-                <a:latin typeface="Arial"/>
-                <a:ea typeface="Arial"/>
-                <a:cs typeface="Arial"/>
-              </a:rPr>
-              <a:t>створення міжнародної системи моніторингу інформації та підтримки прийняття рішень в галузі міжнародного науково-технічного співробітництва. </a:t>
-            </a:r>
-            <a:endParaRPr u="sng"/>
-          </a:p>
-        </p:txBody>
-      </p:sp>
+            <a:endParaRPr/>
+          </a:p>
+        </p:txBody>
+      </p:sp>
+      <p:sp>
+        <p:nvSpPr>
+          <p:cNvPr id="6" name="" hidden="0"/>
+          <p:cNvSpPr/>
+          <p:nvPr isPhoto="0" userDrawn="0"/>
+        </p:nvSpPr>
+        <p:spPr bwMode="auto">
+          <a:xfrm>
+            <a:off x="6559110" y="3059917"/>
+            <a:ext cx="11010899" cy="7362824"/>
+          </a:xfrm>
+        </p:spPr>
+        <p:txBody>
+          <a:bodyPr rot="0" spcFirstLastPara="0" vertOverflow="overflow" horzOverflow="clip" vert="horz" wrap="square" lIns="91440" tIns="45720" rIns="91440" bIns="45720" numCol="1" spcCol="0" rtlCol="0" fromWordArt="0" anchor="t" anchorCtr="0" forceAA="0" upright="0" compatLnSpc="1">
+            <a:prstTxWarp prst="textNoShape"/>
+            <a:noAutofit/>
+          </a:bodyPr>
+          <a:p>
+            <a:pPr>
+              <a:defRPr/>
+            </a:pPr>
+            <a:endParaRPr/>
+          </a:p>
+        </p:txBody>
+      </p:sp>
+      <p:pic>
+        <p:nvPicPr>
+          <p:cNvPr id="7" name="" hidden="0"/>
+          <p:cNvPicPr>
+            <a:picLocks noChangeAspect="1"/>
+          </p:cNvPicPr>
+          <p:nvPr isPhoto="0" userDrawn="0"/>
+        </p:nvPicPr>
+        <p:blipFill>
+          <a:blip r:embed="rId2"/>
+          <a:stretch/>
+        </p:blipFill>
+        <p:spPr bwMode="auto">
+          <a:xfrm flipH="0" flipV="0">
+            <a:off x="1003542" y="22705"/>
+            <a:ext cx="10184915" cy="6810501"/>
+          </a:xfrm>
+          <a:prstGeom prst="rect">
+            <a:avLst/>
+          </a:prstGeom>
+        </p:spPr>
+      </p:pic>
     </p:spTree>
   </p:cSld>
   <p:clrMapOvr>
@@ -4589,15 +3978,8 @@
               <a:defRPr/>
             </a:pPr>
             <a:r>
-              <a:rPr lang="en-US" sz="4400" b="0" i="0" u="none" strike="noStrike" cap="none" spc="0">
-                <a:solidFill>
-                  <a:schemeClr val="tx1"/>
-                </a:solidFill>
-                <a:latin typeface="+mj-lt"/>
-                <a:ea typeface="+mj-ea"/>
-                <a:cs typeface="+mj-cs"/>
-              </a:rPr>
-              <a:t>Актуальність дослідження. Проблема </a:t>
+              <a:rPr/>
+              <a:t>Extended usecases</a:t>
             </a:r>
             <a:endParaRPr/>
           </a:p>
@@ -4615,42 +3997,65 @@
         </p:nvSpPr>
         <p:spPr bwMode="auto"/>
         <p:txBody>
-          <a:bodyPr/>
-          <a:lstStyle/>
-          <a:p>
-            <a:pPr marL="0" indent="0">
-              <a:buFont typeface="Arial"/>
-              <a:buNone/>
-              <a:defRPr/>
-            </a:pPr>
-            <a:r>
-              <a:rPr/>
-              <a:t>Робота актуальна тому, що звязана із автоматизацією пошуку інформації про міжнародну діяльність. </a:t>
-            </a:r>
-            <a:endParaRPr/>
-          </a:p>
-          <a:p>
-            <a:pPr marL="0" indent="0">
-              <a:buFont typeface="Arial"/>
-              <a:buNone/>
-              <a:defRPr/>
-            </a:pPr>
-            <a:endParaRPr/>
-          </a:p>
-          <a:p>
-            <a:pPr marL="0" indent="0">
-              <a:buFont typeface="Arial"/>
-              <a:buNone/>
-              <a:defRPr/>
-            </a:pPr>
-            <a:r>
-              <a:rPr/>
-              <a:t>Результати роботи дозволять зменшити час, витрачений на пошук і аналіз даних про міжнародне науково-технічне співробітництво і таким чином зменшить витрати.</a:t>
-            </a:r>
-            <a:endParaRPr/>
-          </a:p>
-        </p:txBody>
-      </p:sp>
+          <a:bodyPr vertOverflow="overflow" horzOverflow="clip" vert="horz" wrap="square" lIns="91440" tIns="45720" rIns="91440" bIns="45720" numCol="1" spcCol="0" rtlCol="0" fromWordArt="0" anchor="t" anchorCtr="0" forceAA="0" upright="0" compatLnSpc="0">
+            <a:normAutofit/>
+          </a:bodyPr>
+          <a:lstStyle/>
+          <a:p>
+            <a:pPr>
+              <a:defRPr/>
+            </a:pPr>
+            <a:endParaRPr/>
+          </a:p>
+        </p:txBody>
+      </p:sp>
+      <p:sp>
+        <p:nvSpPr>
+          <p:cNvPr id="6" name="" hidden="0"/>
+          <p:cNvSpPr/>
+          <p:nvPr isPhoto="0" userDrawn="0"/>
+        </p:nvSpPr>
+        <p:spPr bwMode="auto">
+          <a:xfrm>
+            <a:off x="6559110" y="3059917"/>
+            <a:ext cx="11010899" cy="7362824"/>
+          </a:xfrm>
+        </p:spPr>
+        <p:txBody>
+          <a:bodyPr rot="0" spcFirstLastPara="0" vertOverflow="overflow" horzOverflow="clip" vert="horz" wrap="square" lIns="91440" tIns="45720" rIns="91440" bIns="45720" numCol="1" spcCol="0" rtlCol="0" fromWordArt="0" anchor="t" anchorCtr="0" forceAA="0" upright="0" compatLnSpc="1">
+            <a:prstTxWarp prst="textNoShape"/>
+            <a:noAutofit/>
+          </a:bodyPr>
+          <a:p>
+            <a:pPr>
+              <a:defRPr/>
+            </a:pPr>
+            <a:endParaRPr/>
+          </a:p>
+        </p:txBody>
+      </p:sp>
+      <p:pic>
+        <p:nvPicPr>
+          <p:cNvPr id="7" name="" hidden="0"/>
+          <p:cNvPicPr>
+            <a:picLocks noChangeAspect="1"/>
+          </p:cNvPicPr>
+          <p:nvPr isPhoto="0" userDrawn="0"/>
+        </p:nvPicPr>
+        <p:blipFill>
+          <a:blip r:embed="rId2"/>
+          <a:stretch/>
+        </p:blipFill>
+        <p:spPr bwMode="auto">
+          <a:xfrm>
+            <a:off x="1100137" y="1966912"/>
+            <a:ext cx="9991724" cy="4210049"/>
+          </a:xfrm>
+          <a:prstGeom prst="rect">
+            <a:avLst/>
+          </a:prstGeom>
+        </p:spPr>
+      </p:pic>
     </p:spTree>
   </p:cSld>
   <p:clrMapOvr>
@@ -4711,7 +4116,7 @@
             </a:pPr>
             <a:r>
               <a:rPr/>
-              <a:t>Протиріччя</a:t>
+              <a:t>Plan of work</a:t>
             </a:r>
             <a:endParaRPr/>
           </a:p>
@@ -4734,363 +4139,44 @@
           </a:bodyPr>
           <a:lstStyle/>
           <a:p>
-            <a:pPr marL="0" indent="0">
-              <a:buFont typeface="Arial"/>
-              <a:buNone/>
+            <a:pPr>
               <a:defRPr/>
             </a:pPr>
             <a:r>
               <a:rPr/>
-              <a:t>Керівництво університетів та інших організацій хоче мати структуровану інформацію про міжнародне співробітництво  інших організацій і хоче зменшити час та інші ресурси, потрібні для приняття решень. </a:t>
-            </a:r>
-            <a:r>
-              <a:rPr lang="en-US" sz="2800" b="0" i="0" u="none" strike="noStrike" cap="none" spc="0">
-                <a:solidFill>
-                  <a:schemeClr val="tx1"/>
-                </a:solidFill>
-                <a:latin typeface="+mn-lt"/>
-                <a:ea typeface="+mn-ea"/>
-                <a:cs typeface="+mn-cs"/>
-              </a:rPr>
-              <a:t> </a:t>
-            </a:r>
-            <a:endParaRPr/>
-          </a:p>
-          <a:p>
-            <a:pPr marL="0" indent="0">
-              <a:buFont typeface="Arial"/>
-              <a:buNone/>
-              <a:defRPr/>
-            </a:pPr>
-            <a:endParaRPr/>
-          </a:p>
-          <a:p>
-            <a:pPr marL="0" indent="0">
-              <a:buFont typeface="Arial"/>
-              <a:buNone/>
+              <a:t>Analyze published KPI reports about international cooperation </a:t>
+            </a:r>
+            <a:endParaRPr/>
+          </a:p>
+          <a:p>
+            <a:pPr>
               <a:defRPr/>
             </a:pPr>
             <a:r>
               <a:rPr/>
-              <a:t>Але звіти про міжнародне співробітництво не є структурованими та уніфікованими (і тому треба багато часу для їх аналізу).</a:t>
-            </a:r>
-            <a:endParaRPr/>
-          </a:p>
-        </p:txBody>
-      </p:sp>
-    </p:spTree>
-  </p:cSld>
-  <p:clrMapOvr>
-    <a:masterClrMapping/>
-  </p:clrMapOvr>
-  <mc:AlternateContent xmlns:mc="http://schemas.openxmlformats.org/markup-compatibility/2006">
-    <mc:Choice xmlns:p14="http://schemas.microsoft.com/office/powerpoint/2010/main" Requires="p14">
-      <p:transition p14:dur="2000" advClick="1"/>
-    </mc:Choice>
-    <mc:Fallback>
-      <p:transition advClick="1"/>
-    </mc:Fallback>
-  </mc:AlternateContent>
-</p:sld>
-</file>
-
-<file path=ppt/slides/slide8.xml><?xml version="1.0" encoding="utf-8"?>
-<p:sld xmlns:a="http://schemas.openxmlformats.org/drawingml/2006/main" xmlns:r="http://schemas.openxmlformats.org/officeDocument/2006/relationships" xmlns:p="http://schemas.openxmlformats.org/presentationml/2006/main" xmlns:m="http://schemas.openxmlformats.org/officeDocument/2006/math" xmlns:w="http://schemas.openxmlformats.org/wordprocessingml/2006/main" showMasterPhAnim="0" show="1">
-  <p:cSld name="">
-    <p:bg>
-      <p:bgPr shadeToTitle="0">
-        <a:solidFill>
-          <a:srgbClr val="B6F573"/>
-        </a:solidFill>
-      </p:bgPr>
-    </p:bg>
-    <p:spTree>
-      <p:nvGrpSpPr>
-        <p:cNvPr id="1" name="" hidden="0"/>
-        <p:cNvGrpSpPr/>
-        <p:nvPr isPhoto="0" userDrawn="0"/>
-      </p:nvGrpSpPr>
-      <p:grpSpPr bwMode="auto">
-        <a:xfrm>
-          <a:off x="0" y="0"/>
-          <a:ext cx="0" cy="0"/>
-          <a:chOff x="0" y="0"/>
-          <a:chExt cx="0" cy="0"/>
-        </a:xfrm>
-      </p:grpSpPr>
-      <p:sp>
-        <p:nvSpPr>
-          <p:cNvPr id="4" name="Title 1" hidden="0"/>
-          <p:cNvSpPr>
-            <a:spLocks noGrp="1"/>
-          </p:cNvSpPr>
-          <p:nvPr isPhoto="0" userDrawn="0">
-            <p:ph type="title" hasCustomPrompt="0"/>
-          </p:nvPr>
-        </p:nvSpPr>
-        <p:spPr bwMode="auto"/>
-        <p:txBody>
-          <a:bodyPr/>
-          <a:lstStyle/>
+              <a:t>Create an ontology to describe different entities related to internatoinal cooperation </a:t>
+            </a:r>
+            <a:endParaRPr/>
+          </a:p>
           <a:p>
             <a:pPr>
               <a:defRPr/>
             </a:pPr>
             <a:r>
               <a:rPr/>
-              <a:t>Об'єкт , суб'єкт дослідження </a:t>
-            </a:r>
-            <a:endParaRPr/>
-          </a:p>
-        </p:txBody>
-      </p:sp>
-      <p:sp>
-        <p:nvSpPr>
-          <p:cNvPr id="5" name="Content Placeholder 2" hidden="0"/>
-          <p:cNvSpPr>
-            <a:spLocks noGrp="1"/>
-          </p:cNvSpPr>
-          <p:nvPr isPhoto="0" userDrawn="0">
-            <p:ph idx="1" hasCustomPrompt="0"/>
-          </p:nvPr>
-        </p:nvSpPr>
-        <p:spPr bwMode="auto"/>
-        <p:txBody>
-          <a:bodyPr vertOverflow="overflow" horzOverflow="clip" vert="horz" wrap="square" lIns="91440" tIns="45720" rIns="91440" bIns="45720" numCol="1" spcCol="0" rtlCol="0" fromWordArt="0" anchor="t" anchorCtr="0" forceAA="0" upright="0" compatLnSpc="0">
-            <a:normAutofit/>
-          </a:bodyPr>
-          <a:lstStyle/>
+              <a:t>Create an ontology to describe integration information (with realtional databases, NoSQL databases, public OWL files )</a:t>
+            </a:r>
+            <a:endParaRPr/>
+          </a:p>
           <a:p>
             <a:pPr>
               <a:defRPr/>
             </a:pPr>
             <a:r>
               <a:rPr/>
-              <a:t>Об'єкт - онтологія мета даних ресурсів</a:t>
-            </a:r>
-            <a:endParaRPr/>
-          </a:p>
-          <a:p>
-            <a:pPr marL="0" indent="0">
-              <a:buFont typeface="Arial"/>
-              <a:buNone/>
-              <a:defRPr/>
-            </a:pPr>
-            <a:endParaRPr/>
-          </a:p>
-          <a:p>
-            <a:pPr>
-              <a:defRPr/>
-            </a:pPr>
-            <a:endParaRPr/>
-          </a:p>
-          <a:p>
-            <a:pPr>
-              <a:defRPr/>
-            </a:pPr>
-            <a:r>
-              <a:rPr/>
-              <a:t>Мета</a:t>
-            </a:r>
-            <a:r>
-              <a:rPr/>
-              <a:t> дисертаційної роботи - автоматизувати </a:t>
-            </a:r>
-            <a:r>
-              <a:rPr lang="en-US" sz="2800" b="0" i="0" u="none" strike="noStrike" cap="none" spc="0">
-                <a:solidFill>
-                  <a:schemeClr val="tx1"/>
-                </a:solidFill>
-                <a:latin typeface="+mn-lt"/>
-                <a:ea typeface="+mn-ea"/>
-                <a:cs typeface="+mn-cs"/>
-              </a:rPr>
-              <a:t>(швидкість)пошук інформації у звітах про міжнародне співробітництво </a:t>
-            </a:r>
-            <a:r>
-              <a:rPr/>
-              <a:t>і таким чином спростити і здешевити приняття рішень </a:t>
-            </a:r>
-            <a:r>
-              <a:rPr lang="en-US" sz="2800" b="0" i="0" u="none" strike="noStrike" cap="none" spc="0">
-                <a:solidFill>
-                  <a:schemeClr val="tx1"/>
-                </a:solidFill>
-                <a:latin typeface="Arial"/>
-                <a:ea typeface="Arial"/>
-                <a:cs typeface="Arial"/>
-              </a:rPr>
-              <a:t>в галузі міжнародного науково-технічного співробітництва</a:t>
-            </a:r>
-            <a:endParaRPr u="none"/>
-          </a:p>
-        </p:txBody>
-      </p:sp>
-    </p:spTree>
-  </p:cSld>
-  <p:clrMapOvr>
-    <a:masterClrMapping/>
-  </p:clrMapOvr>
-  <mc:AlternateContent xmlns:mc="http://schemas.openxmlformats.org/markup-compatibility/2006">
-    <mc:Choice xmlns:p14="http://schemas.microsoft.com/office/powerpoint/2010/main" Requires="p14">
-      <p:transition p14:dur="2000" advClick="1"/>
-    </mc:Choice>
-    <mc:Fallback>
-      <p:transition advClick="1"/>
-    </mc:Fallback>
-  </mc:AlternateContent>
-</p:sld>
-</file>
-
-<file path=ppt/slides/slide9.xml><?xml version="1.0" encoding="utf-8"?>
-<p:sld xmlns:a="http://schemas.openxmlformats.org/drawingml/2006/main" xmlns:r="http://schemas.openxmlformats.org/officeDocument/2006/relationships" xmlns:p="http://schemas.openxmlformats.org/presentationml/2006/main" xmlns:m="http://schemas.openxmlformats.org/officeDocument/2006/math" xmlns:w="http://schemas.openxmlformats.org/wordprocessingml/2006/main" showMasterPhAnim="0" show="1">
-  <p:cSld name="">
-    <p:bg>
-      <p:bgPr shadeToTitle="0">
-        <a:solidFill>
-          <a:srgbClr val="B6F573"/>
-        </a:solidFill>
-      </p:bgPr>
-    </p:bg>
-    <p:spTree>
-      <p:nvGrpSpPr>
-        <p:cNvPr id="1" name="" hidden="0"/>
-        <p:cNvGrpSpPr/>
-        <p:nvPr isPhoto="0" userDrawn="0"/>
-      </p:nvGrpSpPr>
-      <p:grpSpPr bwMode="auto">
-        <a:xfrm>
-          <a:off x="0" y="0"/>
-          <a:ext cx="0" cy="0"/>
-          <a:chOff x="0" y="0"/>
-          <a:chExt cx="0" cy="0"/>
-        </a:xfrm>
-      </p:grpSpPr>
-      <p:sp>
-        <p:nvSpPr>
-          <p:cNvPr id="4" name="Title 1" hidden="0"/>
-          <p:cNvSpPr>
-            <a:spLocks noGrp="1"/>
-          </p:cNvSpPr>
-          <p:nvPr isPhoto="0" userDrawn="0">
-            <p:ph type="title" hasCustomPrompt="0"/>
-          </p:nvPr>
-        </p:nvSpPr>
-        <p:spPr bwMode="auto"/>
-        <p:txBody>
-          <a:bodyPr/>
-          <a:lstStyle/>
-          <a:p>
-            <a:pPr>
-              <a:defRPr/>
-            </a:pPr>
-            <a:r>
-              <a:rPr lang="en-US" sz="4400" b="0" i="0" u="none" strike="noStrike" cap="none" spc="0">
-                <a:solidFill>
-                  <a:schemeClr val="tx1"/>
-                </a:solidFill>
-                <a:latin typeface="Arial"/>
-                <a:ea typeface="Arial"/>
-                <a:cs typeface="Arial"/>
-              </a:rPr>
-              <a:t>Загальне наукове завдання</a:t>
-            </a:r>
-            <a:endParaRPr/>
-          </a:p>
-        </p:txBody>
-      </p:sp>
-      <p:sp>
-        <p:nvSpPr>
-          <p:cNvPr id="5" name="Content Placeholder 2" hidden="0"/>
-          <p:cNvSpPr>
-            <a:spLocks noGrp="1"/>
-          </p:cNvSpPr>
-          <p:nvPr isPhoto="0" userDrawn="0">
-            <p:ph idx="1" hasCustomPrompt="0"/>
-          </p:nvPr>
-        </p:nvSpPr>
-        <p:spPr bwMode="auto"/>
-        <p:txBody>
-          <a:bodyPr/>
-          <a:lstStyle/>
-          <a:p>
-            <a:pPr>
-              <a:defRPr/>
-            </a:pPr>
-            <a:r>
-              <a:rPr>
-                <a:solidFill>
-                  <a:schemeClr val="tx1"/>
-                </a:solidFill>
-              </a:rPr>
-              <a:t>розробити методику збору інформації про міжнародне співробітництво</a:t>
-            </a:r>
-            <a:r>
-              <a:rPr>
-                <a:solidFill>
-                  <a:schemeClr val="tx1"/>
-                </a:solidFill>
-              </a:rPr>
-              <a:t> на основі онтологій</a:t>
-            </a:r>
-            <a:endParaRPr>
-              <a:solidFill>
-                <a:schemeClr val="tx1"/>
-              </a:solidFill>
-            </a:endParaRPr>
-          </a:p>
-          <a:p>
-            <a:pPr>
-              <a:defRPr/>
-            </a:pPr>
-            <a:endParaRPr>
-              <a:solidFill>
-                <a:schemeClr val="tx1"/>
-              </a:solidFill>
-            </a:endParaRPr>
-          </a:p>
-          <a:p>
-            <a:pPr marL="0" indent="0">
-              <a:buFont typeface="Arial"/>
-              <a:buNone/>
-              <a:defRPr/>
-            </a:pPr>
-            <a:endParaRPr>
-              <a:solidFill>
-                <a:schemeClr val="tx1"/>
-              </a:solidFill>
-            </a:endParaRPr>
-          </a:p>
-          <a:p>
-            <a:pPr>
-              <a:defRPr/>
-            </a:pPr>
-            <a:endParaRPr>
-              <a:solidFill>
-                <a:schemeClr val="tx1"/>
-              </a:solidFill>
-            </a:endParaRPr>
-          </a:p>
-          <a:p>
-            <a:pPr>
-              <a:defRPr/>
-            </a:pPr>
-            <a:r>
-              <a:rPr lang="en-US" sz="2800" b="0" i="0" u="none" strike="noStrike" cap="none" spc="0">
-                <a:solidFill>
-                  <a:schemeClr val="tx1"/>
-                </a:solidFill>
-                <a:latin typeface="+mn-lt"/>
-                <a:ea typeface="+mn-ea"/>
-                <a:cs typeface="+mn-cs"/>
-              </a:rPr>
-              <a:t>розробити програмне забеспечення для перегляду та аналізу знайдених знань</a:t>
-            </a:r>
-            <a:endParaRPr>
-              <a:solidFill>
-                <a:schemeClr val="tx1"/>
-              </a:solidFill>
-            </a:endParaRPr>
+              <a:t>Develop a platform for ontology editing and integration</a:t>
+            </a:r>
+            <a:endParaRPr/>
           </a:p>
         </p:txBody>
       </p:sp>

</xml_diff>